<commit_message>
add small changes and include HW forecast in appendix
</commit_message>
<xml_diff>
--- a/Lessons/G_RF_TimeSeries/TimeSeries.pptx
+++ b/Lessons/G_RF_TimeSeries/TimeSeries.pptx
@@ -254,7 +254,7 @@
           <a:p>
             <a:fld id="{C63082B1-427E-41DB-ABE5-DAB9BFFC394E}" type="datetimeFigureOut">
               <a:rPr lang="en-US" smtClean="0"/>
-              <a:t>10/25/21</a:t>
+              <a:t>3/21/22</a:t>
             </a:fld>
             <a:endParaRPr lang="en-US"/>
           </a:p>
@@ -419,7 +419,7 @@
           <a:p>
             <a:fld id="{C333ABA6-B72D-4ED4-A6E7-13A0DAE65F1A}" type="datetimeFigureOut">
               <a:rPr lang="en-US" smtClean="0"/>
-              <a:t>10/25/21</a:t>
+              <a:t>3/21/22</a:t>
             </a:fld>
             <a:endParaRPr lang="en-US"/>
           </a:p>
@@ -1704,7 +1704,7 @@
           <a:p>
             <a:fld id="{5738B90E-0779-4C36-915C-6F05FCD89456}" type="datetime1">
               <a:rPr lang="en-US" smtClean="0"/>
-              <a:t>10/25/21</a:t>
+              <a:t>3/21/22</a:t>
             </a:fld>
             <a:endParaRPr lang="en-US"/>
           </a:p>
@@ -1922,7 +1922,7 @@
           <a:p>
             <a:fld id="{7B9EA29D-D431-42FE-B7B6-AAE4454C77D3}" type="datetime1">
               <a:rPr lang="en-US" smtClean="0"/>
-              <a:t>10/25/21</a:t>
+              <a:t>3/21/22</a:t>
             </a:fld>
             <a:endParaRPr lang="en-US"/>
           </a:p>
@@ -2182,7 +2182,7 @@
           <a:p>
             <a:fld id="{690D8A1E-EA8F-46C1-B891-AE0C00D9C314}" type="datetime1">
               <a:rPr lang="en-US" smtClean="0"/>
-              <a:t>10/25/21</a:t>
+              <a:t>3/21/22</a:t>
             </a:fld>
             <a:endParaRPr lang="en-US"/>
           </a:p>
@@ -2476,7 +2476,7 @@
           <a:p>
             <a:fld id="{D753EFC8-4232-4598-94F6-94C0EBAFC469}" type="datetime1">
               <a:rPr lang="en-US" smtClean="0"/>
-              <a:t>10/25/21</a:t>
+              <a:t>3/21/22</a:t>
             </a:fld>
             <a:endParaRPr lang="en-US"/>
           </a:p>
@@ -2791,7 +2791,7 @@
           <a:p>
             <a:fld id="{F3161074-1C18-4AE7-957D-F18524378C85}" type="datetime1">
               <a:rPr lang="en-US" smtClean="0"/>
-              <a:t>10/25/21</a:t>
+              <a:t>3/21/22</a:t>
             </a:fld>
             <a:endParaRPr lang="en-US"/>
           </a:p>
@@ -3065,7 +3065,7 @@
           <a:p>
             <a:fld id="{69BE256C-8D9A-4404-B47D-41A1AE514425}" type="datetime1">
               <a:rPr lang="en-US" smtClean="0"/>
-              <a:t>10/25/21</a:t>
+              <a:t>3/21/22</a:t>
             </a:fld>
             <a:endParaRPr lang="en-US"/>
           </a:p>
@@ -3499,7 +3499,7 @@
           <a:p>
             <a:fld id="{66CB2154-9035-4012-8189-BAAB61C5A5EE}" type="datetime1">
               <a:rPr lang="en-US" smtClean="0"/>
-              <a:t>10/25/21</a:t>
+              <a:t>3/21/22</a:t>
             </a:fld>
             <a:endParaRPr lang="en-US"/>
           </a:p>
@@ -3673,7 +3673,7 @@
           <a:p>
             <a:fld id="{6700A58B-DD98-43D0-B791-721480A02982}" type="datetime1">
               <a:rPr lang="en-US" smtClean="0"/>
-              <a:t>10/25/21</a:t>
+              <a:t>3/21/22</a:t>
             </a:fld>
             <a:endParaRPr lang="en-US"/>
           </a:p>
@@ -3865,7 +3865,7 @@
           <a:p>
             <a:fld id="{7DB6E382-4F61-4E24-BE1A-377EC83D0E3A}" type="datetime1">
               <a:rPr lang="en-US" smtClean="0"/>
-              <a:t>10/25/21</a:t>
+              <a:t>3/21/22</a:t>
             </a:fld>
             <a:endParaRPr lang="en-US"/>
           </a:p>
@@ -4176,7 +4176,7 @@
           <a:p>
             <a:fld id="{4142EED6-FC16-45B9-B8C4-2BC5DBA88325}" type="datetime1">
               <a:rPr lang="en-US" smtClean="0"/>
-              <a:t>10/25/21</a:t>
+              <a:t>3/21/22</a:t>
             </a:fld>
             <a:endParaRPr lang="en-US"/>
           </a:p>
@@ -4494,7 +4494,7 @@
           <a:p>
             <a:fld id="{DF59512B-4F1D-43D7-8819-2F53FEF69650}" type="datetime1">
               <a:rPr lang="en-US" smtClean="0"/>
-              <a:t>10/25/21</a:t>
+              <a:t>3/21/22</a:t>
             </a:fld>
             <a:endParaRPr lang="en-US"/>
           </a:p>
@@ -4770,7 +4770,7 @@
           <a:p>
             <a:fld id="{08437B94-E2BF-44DC-ADC5-B05FC9934E9D}" type="datetime1">
               <a:rPr lang="en-US" smtClean="0"/>
-              <a:t>10/25/21</a:t>
+              <a:t>3/21/22</a:t>
             </a:fld>
             <a:endParaRPr lang="en-US"/>
           </a:p>
@@ -5290,7 +5290,7 @@
           <a:p>
             <a:fld id="{F3161074-1C18-4AE7-957D-F18524378C85}" type="datetime1">
               <a:rPr lang="en-US" smtClean="0"/>
-              <a:t>10/25/21</a:t>
+              <a:t>3/21/22</a:t>
             </a:fld>
             <a:endParaRPr lang="en-US"/>
           </a:p>
@@ -5406,7 +5406,7 @@
           <a:p>
             <a:fld id="{6700A58B-DD98-43D0-B791-721480A02982}" type="datetime1">
               <a:rPr lang="en-US" smtClean="0"/>
-              <a:t>10/25/21</a:t>
+              <a:t>3/21/22</a:t>
             </a:fld>
             <a:endParaRPr lang="en-US"/>
           </a:p>
@@ -5639,7 +5639,7 @@
           <a:p>
             <a:fld id="{6700A58B-DD98-43D0-B791-721480A02982}" type="datetime1">
               <a:rPr lang="en-US" smtClean="0"/>
-              <a:t>10/25/21</a:t>
+              <a:t>3/21/22</a:t>
             </a:fld>
             <a:endParaRPr lang="en-US"/>
           </a:p>
@@ -5879,7 +5879,7 @@
           <a:p>
             <a:fld id="{6700A58B-DD98-43D0-B791-721480A02982}" type="datetime1">
               <a:rPr lang="en-US" smtClean="0"/>
-              <a:t>10/25/21</a:t>
+              <a:t>3/21/22</a:t>
             </a:fld>
             <a:endParaRPr lang="en-US"/>
           </a:p>
@@ -6223,7 +6223,7 @@
             </a:pPr>
             <a:r>
               <a:rPr lang="en-US" b="1" dirty="0"/>
-              <a:t>Seasonality* appears:</a:t>
+              <a:t>Seasonality* appears when zoomed in:</a:t>
             </a:r>
           </a:p>
           <a:p>
@@ -6326,7 +6326,7 @@
           <a:p>
             <a:fld id="{D753EFC8-4232-4598-94F6-94C0EBAFC469}" type="datetime1">
               <a:rPr lang="en-US" smtClean="0"/>
-              <a:t>10/25/21</a:t>
+              <a:t>3/21/22</a:t>
             </a:fld>
             <a:endParaRPr lang="en-US"/>
           </a:p>
@@ -6865,7 +6865,7 @@
           <a:p>
             <a:fld id="{D753EFC8-4232-4598-94F6-94C0EBAFC469}" type="datetime1">
               <a:rPr lang="en-US" smtClean="0"/>
-              <a:t>10/25/21</a:t>
+              <a:t>3/21/22</a:t>
             </a:fld>
             <a:endParaRPr lang="en-US"/>
           </a:p>
@@ -7319,7 +7319,7 @@
           <a:p>
             <a:fld id="{D753EFC8-4232-4598-94F6-94C0EBAFC469}" type="datetime1">
               <a:rPr lang="en-US" smtClean="0"/>
-              <a:t>10/25/21</a:t>
+              <a:t>3/21/22</a:t>
             </a:fld>
             <a:endParaRPr lang="en-US"/>
           </a:p>
@@ -7379,6 +7379,100 @@
           </a:p>
         </p:txBody>
       </p:sp>
+      <p:sp>
+        <p:nvSpPr>
+          <p:cNvPr id="18" name="Rectangle 17">
+            <a:extLst>
+              <a:ext uri="{FF2B5EF4-FFF2-40B4-BE49-F238E27FC236}">
+                <a16:creationId xmlns:a16="http://schemas.microsoft.com/office/drawing/2014/main" id="{DD56A4AD-7DD2-D241-95BF-48B926EAF072}"/>
+              </a:ext>
+            </a:extLst>
+          </p:cNvPr>
+          <p:cNvSpPr/>
+          <p:nvPr/>
+        </p:nvSpPr>
+        <p:spPr>
+          <a:xfrm>
+            <a:off x="7184342" y="1995224"/>
+            <a:ext cx="332244" cy="363549"/>
+          </a:xfrm>
+          <a:prstGeom prst="rect">
+            <a:avLst/>
+          </a:prstGeom>
+          <a:noFill/>
+          <a:ln w="57150">
+            <a:solidFill>
+              <a:schemeClr val="accent6"/>
+            </a:solidFill>
+          </a:ln>
+        </p:spPr>
+        <p:style>
+          <a:lnRef idx="2">
+            <a:schemeClr val="accent1">
+              <a:shade val="50000"/>
+            </a:schemeClr>
+          </a:lnRef>
+          <a:fillRef idx="1">
+            <a:schemeClr val="accent1"/>
+          </a:fillRef>
+          <a:effectRef idx="0">
+            <a:schemeClr val="accent1"/>
+          </a:effectRef>
+          <a:fontRef idx="minor">
+            <a:schemeClr val="lt1"/>
+          </a:fontRef>
+        </p:style>
+        <p:txBody>
+          <a:bodyPr rtlCol="0" anchor="ctr"/>
+          <a:lstStyle/>
+          <a:p>
+            <a:pPr algn="ctr"/>
+            <a:endParaRPr lang="en-US"/>
+          </a:p>
+        </p:txBody>
+      </p:sp>
+      <p:cxnSp>
+        <p:nvCxnSpPr>
+          <p:cNvPr id="19" name="Straight Arrow Connector 18">
+            <a:extLst>
+              <a:ext uri="{FF2B5EF4-FFF2-40B4-BE49-F238E27FC236}">
+                <a16:creationId xmlns:a16="http://schemas.microsoft.com/office/drawing/2014/main" id="{0D37615B-BB2E-7147-856A-4B884392D9E9}"/>
+              </a:ext>
+            </a:extLst>
+          </p:cNvPr>
+          <p:cNvCxnSpPr>
+            <a:cxnSpLocks/>
+            <a:endCxn id="18" idx="2"/>
+          </p:cNvCxnSpPr>
+          <p:nvPr/>
+        </p:nvCxnSpPr>
+        <p:spPr>
+          <a:xfrm flipV="1">
+            <a:off x="4712677" y="2358773"/>
+            <a:ext cx="2637787" cy="3509464"/>
+          </a:xfrm>
+          <a:prstGeom prst="straightConnector1">
+            <a:avLst/>
+          </a:prstGeom>
+          <a:ln>
+            <a:tailEnd type="triangle"/>
+          </a:ln>
+        </p:spPr>
+        <p:style>
+          <a:lnRef idx="1">
+            <a:schemeClr val="accent1"/>
+          </a:lnRef>
+          <a:fillRef idx="0">
+            <a:schemeClr val="accent1"/>
+          </a:fillRef>
+          <a:effectRef idx="0">
+            <a:schemeClr val="accent1"/>
+          </a:effectRef>
+          <a:fontRef idx="minor">
+            <a:schemeClr val="tx1"/>
+          </a:fontRef>
+        </p:style>
+      </p:cxnSp>
     </p:spTree>
     <p:extLst>
       <p:ext uri="{BB962C8B-B14F-4D97-AF65-F5344CB8AC3E}">
@@ -7773,7 +7867,7 @@
           <a:p>
             <a:fld id="{D753EFC8-4232-4598-94F6-94C0EBAFC469}" type="datetime1">
               <a:rPr lang="en-US" smtClean="0"/>
-              <a:t>10/25/21</a:t>
+              <a:t>3/21/22</a:t>
             </a:fld>
             <a:endParaRPr lang="en-US"/>
           </a:p>
@@ -8233,7 +8327,7 @@
           <a:p>
             <a:fld id="{D753EFC8-4232-4598-94F6-94C0EBAFC469}" type="datetime1">
               <a:rPr lang="en-US" smtClean="0"/>
-              <a:t>10/25/21</a:t>
+              <a:t>3/21/22</a:t>
             </a:fld>
             <a:endParaRPr lang="en-US"/>
           </a:p>
@@ -8340,7 +8434,7 @@
           <a:p>
             <a:fld id="{6700A58B-DD98-43D0-B791-721480A02982}" type="datetime1">
               <a:rPr lang="en-US" smtClean="0"/>
-              <a:t>10/25/21</a:t>
+              <a:t>3/21/22</a:t>
             </a:fld>
             <a:endParaRPr lang="en-US"/>
           </a:p>
@@ -9748,7 +9842,7 @@
           <a:p>
             <a:fld id="{D753EFC8-4232-4598-94F6-94C0EBAFC469}" type="datetime1">
               <a:rPr lang="en-US" smtClean="0"/>
-              <a:t>10/25/21</a:t>
+              <a:t>3/21/22</a:t>
             </a:fld>
             <a:endParaRPr lang="en-US"/>
           </a:p>
@@ -10291,7 +10385,7 @@
           <a:p>
             <a:fld id="{9B19E99B-5349-415A-8E56-8E989211A366}" type="datetime1">
               <a:rPr lang="en-US" smtClean="0"/>
-              <a:t>10/25/21</a:t>
+              <a:t>3/21/22</a:t>
             </a:fld>
             <a:endParaRPr lang="en-US"/>
           </a:p>
@@ -10761,7 +10855,7 @@
           <a:p>
             <a:fld id="{D753EFC8-4232-4598-94F6-94C0EBAFC469}" type="datetime1">
               <a:rPr lang="en-US" smtClean="0"/>
-              <a:t>10/25/21</a:t>
+              <a:t>3/21/22</a:t>
             </a:fld>
             <a:endParaRPr lang="en-US"/>
           </a:p>
@@ -11112,7 +11206,7 @@
           <a:p>
             <a:fld id="{D753EFC8-4232-4598-94F6-94C0EBAFC469}" type="datetime1">
               <a:rPr lang="en-US" smtClean="0"/>
-              <a:t>10/25/21</a:t>
+              <a:t>3/21/22</a:t>
             </a:fld>
             <a:endParaRPr lang="en-US"/>
           </a:p>
@@ -11222,7 +11316,7 @@
           <a:graphicData uri="http://schemas.openxmlformats.org/presentationml/2006/ole">
             <mc:AlternateContent xmlns:mc="http://schemas.openxmlformats.org/markup-compatibility/2006">
               <mc:Choice xmlns:v="urn:schemas-microsoft-com:vml" Requires="v">
-                <p:oleObj spid="_x0000_s3139" name="think-cell Slide" r:id="rId5" imgW="270" imgH="270" progId="TCLayout.ActiveDocument.1">
+                <p:oleObj spid="_x0000_s3140" name="think-cell Slide" r:id="rId5" imgW="270" imgH="270" progId="TCLayout.ActiveDocument.1">
                   <p:embed/>
                 </p:oleObj>
               </mc:Choice>
@@ -11583,7 +11677,7 @@
           <a:p>
             <a:fld id="{D753EFC8-4232-4598-94F6-94C0EBAFC469}" type="datetime1">
               <a:rPr lang="en-US" smtClean="0"/>
-              <a:t>10/25/21</a:t>
+              <a:t>3/21/22</a:t>
             </a:fld>
             <a:endParaRPr lang="en-US"/>
           </a:p>
@@ -11744,7 +11838,7 @@
           <a:p>
             <a:fld id="{D753EFC8-4232-4598-94F6-94C0EBAFC469}" type="datetime1">
               <a:rPr lang="en-US" smtClean="0"/>
-              <a:t>10/25/21</a:t>
+              <a:t>3/21/22</a:t>
             </a:fld>
             <a:endParaRPr lang="en-US"/>
           </a:p>
@@ -11845,7 +11939,7 @@
           <a:graphicData uri="http://schemas.openxmlformats.org/presentationml/2006/ole">
             <mc:AlternateContent xmlns:mc="http://schemas.openxmlformats.org/markup-compatibility/2006">
               <mc:Choice xmlns:v="urn:schemas-microsoft-com:vml" Requires="v">
-                <p:oleObj spid="_x0000_s17470" name="think-cell Slide" r:id="rId5" imgW="270" imgH="270" progId="TCLayout.ActiveDocument.1">
+                <p:oleObj spid="_x0000_s17471" name="think-cell Slide" r:id="rId5" imgW="270" imgH="270" progId="TCLayout.ActiveDocument.1">
                   <p:embed/>
                 </p:oleObj>
               </mc:Choice>
@@ -12041,7 +12135,7 @@
           <a:p>
             <a:fld id="{D753EFC8-4232-4598-94F6-94C0EBAFC469}" type="datetime1">
               <a:rPr lang="en-US" smtClean="0"/>
-              <a:t>10/25/21</a:t>
+              <a:t>3/21/22</a:t>
             </a:fld>
             <a:endParaRPr lang="en-US"/>
           </a:p>
@@ -12614,7 +12708,7 @@
           <a:p>
             <a:fld id="{9B19E99B-5349-415A-8E56-8E989211A366}" type="datetime1">
               <a:rPr lang="en-US" smtClean="0"/>
-              <a:t>10/25/21</a:t>
+              <a:t>3/21/22</a:t>
             </a:fld>
             <a:endParaRPr lang="en-US"/>
           </a:p>
@@ -12715,7 +12809,7 @@
           <a:graphicData uri="http://schemas.openxmlformats.org/presentationml/2006/ole">
             <mc:AlternateContent xmlns:mc="http://schemas.openxmlformats.org/markup-compatibility/2006">
               <mc:Choice xmlns:v="urn:schemas-microsoft-com:vml" Requires="v">
-                <p:oleObj spid="_x0000_s5187" name="think-cell Slide" r:id="rId5" imgW="270" imgH="270" progId="TCLayout.ActiveDocument.1">
+                <p:oleObj spid="_x0000_s5188" name="think-cell Slide" r:id="rId5" imgW="270" imgH="270" progId="TCLayout.ActiveDocument.1">
                   <p:embed/>
                 </p:oleObj>
               </mc:Choice>
@@ -13561,7 +13655,7 @@
           <a:p>
             <a:fld id="{D753EFC8-4232-4598-94F6-94C0EBAFC469}" type="datetime1">
               <a:rPr lang="en-US" smtClean="0"/>
-              <a:t>10/25/21</a:t>
+              <a:t>3/21/22</a:t>
             </a:fld>
             <a:endParaRPr lang="en-US"/>
           </a:p>
@@ -14073,7 +14167,7 @@
           <a:p>
             <a:fld id="{D753EFC8-4232-4598-94F6-94C0EBAFC469}" type="datetime1">
               <a:rPr lang="en-US" smtClean="0"/>
-              <a:t>10/25/21</a:t>
+              <a:t>3/21/22</a:t>
             </a:fld>
             <a:endParaRPr lang="en-US"/>
           </a:p>
@@ -14202,7 +14296,7 @@
           <a:p>
             <a:fld id="{D753EFC8-4232-4598-94F6-94C0EBAFC469}" type="datetime1">
               <a:rPr lang="en-US" smtClean="0"/>
-              <a:t>10/25/21</a:t>
+              <a:t>3/21/22</a:t>
             </a:fld>
             <a:endParaRPr lang="en-US"/>
           </a:p>
@@ -14531,7 +14625,7 @@
           <a:p>
             <a:fld id="{D753EFC8-4232-4598-94F6-94C0EBAFC469}" type="datetime1">
               <a:rPr lang="en-US" smtClean="0"/>
-              <a:t>10/25/21</a:t>
+              <a:t>3/21/22</a:t>
             </a:fld>
             <a:endParaRPr lang="en-US"/>
           </a:p>
@@ -14797,7 +14891,7 @@
           <a:p>
             <a:fld id="{6700A58B-DD98-43D0-B791-721480A02982}" type="datetime1">
               <a:rPr lang="en-US" smtClean="0"/>
-              <a:t>10/25/21</a:t>
+              <a:t>3/21/22</a:t>
             </a:fld>
             <a:endParaRPr lang="en-US"/>
           </a:p>
@@ -15247,7 +15341,7 @@
           <a:p>
             <a:fld id="{D753EFC8-4232-4598-94F6-94C0EBAFC469}" type="datetime1">
               <a:rPr lang="en-US" smtClean="0"/>
-              <a:t>10/25/21</a:t>
+              <a:t>3/21/22</a:t>
             </a:fld>
             <a:endParaRPr lang="en-US"/>
           </a:p>
@@ -15443,12 +15537,8 @@
           <a:lstStyle/>
           <a:p>
             <a:r>
-              <a:rPr lang="en-US" dirty="0" err="1"/>
-              <a:t>Revisting</a:t>
-            </a:r>
-            <a:r>
-              <a:rPr lang="en-US" dirty="0"/>
-              <a:t> Naïve Forecast - Mean</a:t>
+              <a:rPr lang="en-US" dirty="0"/>
+              <a:t>Revisiting Naïve Forecast - Mean</a:t>
             </a:r>
           </a:p>
         </p:txBody>
@@ -15470,7 +15560,7 @@
           <a:p>
             <a:fld id="{D753EFC8-4232-4598-94F6-94C0EBAFC469}" type="datetime1">
               <a:rPr lang="en-US" smtClean="0"/>
-              <a:t>10/25/21</a:t>
+              <a:t>3/21/22</a:t>
             </a:fld>
             <a:endParaRPr lang="en-US"/>
           </a:p>
@@ -15690,7 +15780,7 @@
           <a:p>
             <a:fld id="{D753EFC8-4232-4598-94F6-94C0EBAFC469}" type="datetime1">
               <a:rPr lang="en-US" smtClean="0"/>
-              <a:t>10/25/21</a:t>
+              <a:t>3/21/22</a:t>
             </a:fld>
             <a:endParaRPr lang="en-US"/>
           </a:p>
@@ -16137,7 +16227,7 @@
           <a:p>
             <a:fld id="{D753EFC8-4232-4598-94F6-94C0EBAFC469}" type="datetime1">
               <a:rPr lang="en-US" smtClean="0"/>
-              <a:t>10/25/21</a:t>
+              <a:t>3/21/22</a:t>
             </a:fld>
             <a:endParaRPr lang="en-US"/>
           </a:p>
@@ -16525,7 +16615,7 @@
           <a:p>
             <a:fld id="{D753EFC8-4232-4598-94F6-94C0EBAFC469}" type="datetime1">
               <a:rPr lang="en-US" smtClean="0"/>
-              <a:t>10/25/21</a:t>
+              <a:t>3/21/22</a:t>
             </a:fld>
             <a:endParaRPr lang="en-US"/>
           </a:p>
@@ -17030,7 +17120,7 @@
           <a:p>
             <a:fld id="{D753EFC8-4232-4598-94F6-94C0EBAFC469}" type="datetime1">
               <a:rPr lang="en-US" smtClean="0"/>
-              <a:t>10/25/21</a:t>
+              <a:t>3/21/22</a:t>
             </a:fld>
             <a:endParaRPr lang="en-US"/>
           </a:p>
@@ -17376,7 +17466,7 @@
           <a:p>
             <a:fld id="{D753EFC8-4232-4598-94F6-94C0EBAFC469}" type="datetime1">
               <a:rPr lang="en-US" smtClean="0"/>
-              <a:t>10/25/21</a:t>
+              <a:t>3/21/22</a:t>
             </a:fld>
             <a:endParaRPr lang="en-US"/>
           </a:p>
@@ -17971,7 +18061,7 @@
           <a:p>
             <a:fld id="{D753EFC8-4232-4598-94F6-94C0EBAFC469}" type="datetime1">
               <a:rPr lang="en-US" smtClean="0"/>
-              <a:t>10/25/21</a:t>
+              <a:t>3/21/22</a:t>
             </a:fld>
             <a:endParaRPr lang="en-US"/>
           </a:p>
@@ -18505,7 +18595,7 @@
           <a:p>
             <a:fld id="{9B19E99B-5349-415A-8E56-8E989211A366}" type="datetime1">
               <a:rPr lang="en-US" smtClean="0"/>
-              <a:t>10/25/21</a:t>
+              <a:t>3/21/22</a:t>
             </a:fld>
             <a:endParaRPr lang="en-US"/>
           </a:p>
@@ -18673,7 +18763,7 @@
           <a:p>
             <a:fld id="{D753EFC8-4232-4598-94F6-94C0EBAFC469}" type="datetime1">
               <a:rPr lang="en-US" smtClean="0"/>
-              <a:t>10/25/21</a:t>
+              <a:t>3/21/22</a:t>
             </a:fld>
             <a:endParaRPr lang="en-US"/>
           </a:p>
@@ -19047,7 +19137,7 @@
           <a:p>
             <a:fld id="{6700A58B-DD98-43D0-B791-721480A02982}" type="datetime1">
               <a:rPr lang="en-US" smtClean="0"/>
-              <a:t>10/25/21</a:t>
+              <a:t>3/21/22</a:t>
             </a:fld>
             <a:endParaRPr lang="en-US"/>
           </a:p>
@@ -19568,7 +19658,7 @@
           <a:p>
             <a:fld id="{D753EFC8-4232-4598-94F6-94C0EBAFC469}" type="datetime1">
               <a:rPr lang="en-US" smtClean="0"/>
-              <a:t>10/25/21</a:t>
+              <a:t>3/21/22</a:t>
             </a:fld>
             <a:endParaRPr lang="en-US"/>
           </a:p>
@@ -19960,7 +20050,7 @@
           <a:p>
             <a:fld id="{D753EFC8-4232-4598-94F6-94C0EBAFC469}" type="datetime1">
               <a:rPr lang="en-US" smtClean="0"/>
-              <a:t>10/25/21</a:t>
+              <a:t>3/21/22</a:t>
             </a:fld>
             <a:endParaRPr lang="en-US"/>
           </a:p>
@@ -20491,7 +20581,7 @@
           <a:p>
             <a:fld id="{D753EFC8-4232-4598-94F6-94C0EBAFC469}" type="datetime1">
               <a:rPr lang="en-US" smtClean="0"/>
-              <a:t>10/25/21</a:t>
+              <a:t>3/21/22</a:t>
             </a:fld>
             <a:endParaRPr lang="en-US"/>
           </a:p>
@@ -20781,7 +20871,7 @@
           <a:p>
             <a:fld id="{D753EFC8-4232-4598-94F6-94C0EBAFC469}" type="datetime1">
               <a:rPr lang="en-US" smtClean="0"/>
-              <a:t>10/25/21</a:t>
+              <a:t>3/21/22</a:t>
             </a:fld>
             <a:endParaRPr lang="en-US"/>
           </a:p>
@@ -21071,7 +21161,7 @@
           <a:p>
             <a:fld id="{D753EFC8-4232-4598-94F6-94C0EBAFC469}" type="datetime1">
               <a:rPr lang="en-US" smtClean="0"/>
-              <a:t>10/25/21</a:t>
+              <a:t>3/21/22</a:t>
             </a:fld>
             <a:endParaRPr lang="en-US"/>
           </a:p>
@@ -21451,7 +21541,7 @@
           <a:p>
             <a:fld id="{D753EFC8-4232-4598-94F6-94C0EBAFC469}" type="datetime1">
               <a:rPr lang="en-US" smtClean="0"/>
-              <a:t>10/25/21</a:t>
+              <a:t>3/21/22</a:t>
             </a:fld>
             <a:endParaRPr lang="en-US"/>
           </a:p>
@@ -21716,7 +21806,7 @@
           <a:p>
             <a:fld id="{D753EFC8-4232-4598-94F6-94C0EBAFC469}" type="datetime1">
               <a:rPr lang="en-US" smtClean="0"/>
-              <a:t>10/25/21</a:t>
+              <a:t>3/21/22</a:t>
             </a:fld>
             <a:endParaRPr lang="en-US"/>
           </a:p>
@@ -21829,7 +21919,7 @@
             <p:ph idx="1"/>
             <p:extLst>
               <p:ext uri="{D42A27DB-BD31-4B8C-83A1-F6EECF244321}">
-                <p14:modId xmlns:p14="http://schemas.microsoft.com/office/powerpoint/2010/main" val="2536468322"/>
+                <p14:modId xmlns:p14="http://schemas.microsoft.com/office/powerpoint/2010/main" val="3279161421"/>
               </p:ext>
             </p:extLst>
           </p:nvPr>
@@ -22092,12 +22182,8 @@
                     <a:lstStyle/>
                     <a:p>
                       <a:r>
-                        <a:rPr lang="en-US" sz="2000" dirty="0" err="1"/>
-                        <a:t>HoltWinters</a:t>
-                      </a:r>
-                      <a:r>
                         <a:rPr lang="en-US" sz="2000" dirty="0"/>
-                        <a:t> Forecasting</a:t>
+                        <a:t>Appendix</a:t>
                       </a:r>
                     </a:p>
                   </a:txBody>
@@ -22138,8 +22224,12 @@
                     <a:lstStyle/>
                     <a:p>
                       <a:r>
+                        <a:rPr lang="en-US" sz="2000" dirty="0" err="1"/>
+                        <a:t>HoltWinters</a:t>
+                      </a:r>
+                      <a:r>
                         <a:rPr lang="en-US" sz="2000" dirty="0"/>
-                        <a:t>Appendix</a:t>
+                        <a:t> Forecasting </a:t>
                       </a:r>
                     </a:p>
                   </a:txBody>
@@ -22250,7 +22340,7 @@
           <a:p>
             <a:fld id="{9B19E99B-5349-415A-8E56-8E989211A366}" type="datetime1">
               <a:rPr lang="en-US" smtClean="0"/>
-              <a:t>10/25/21</a:t>
+              <a:t>3/21/22</a:t>
             </a:fld>
             <a:endParaRPr lang="en-US"/>
           </a:p>
@@ -22370,7 +22460,7 @@
           <a:p>
             <a:fld id="{D753EFC8-4232-4598-94F6-94C0EBAFC469}" type="datetime1">
               <a:rPr lang="en-US" smtClean="0"/>
-              <a:t>10/25/21</a:t>
+              <a:t>3/21/22</a:t>
             </a:fld>
             <a:endParaRPr lang="en-US"/>
           </a:p>
@@ -23087,7 +23177,7 @@
           <a:p>
             <a:fld id="{D753EFC8-4232-4598-94F6-94C0EBAFC469}" type="datetime1">
               <a:rPr lang="en-US" smtClean="0"/>
-              <a:t>10/25/21</a:t>
+              <a:t>3/21/22</a:t>
             </a:fld>
             <a:endParaRPr lang="en-US"/>
           </a:p>
@@ -24023,7 +24113,7 @@
           <a:p>
             <a:fld id="{6700A58B-DD98-43D0-B791-721480A02982}" type="datetime1">
               <a:rPr lang="en-US" smtClean="0"/>
-              <a:t>10/25/21</a:t>
+              <a:t>3/21/22</a:t>
             </a:fld>
             <a:endParaRPr lang="en-US"/>
           </a:p>
@@ -24225,7 +24315,7 @@
         </p:nvCxnSpPr>
         <p:spPr>
           <a:xfrm>
-            <a:off x="342912" y="2147888"/>
+            <a:off x="342912" y="2610111"/>
             <a:ext cx="0" cy="1457325"/>
           </a:xfrm>
           <a:prstGeom prst="straightConnector1">
@@ -24261,8 +24351,8 @@
         </p:nvSpPr>
         <p:spPr>
           <a:xfrm rot="16200000">
-            <a:off x="-365100" y="2738051"/>
-            <a:ext cx="1007199" cy="276999"/>
+            <a:off x="-791819" y="3180179"/>
+            <a:ext cx="1860638" cy="276999"/>
           </a:xfrm>
           <a:prstGeom prst="rect">
             <a:avLst/>
@@ -24281,7 +24371,7 @@
                   <a:schemeClr val="accent6"/>
                 </a:solidFill>
               </a:rPr>
-              <a:t>Observations</a:t>
+              <a:t>Time Related Observations</a:t>
             </a:r>
           </a:p>
         </p:txBody>
@@ -24526,7 +24616,7 @@
           <a:p>
             <a:fld id="{D753EFC8-4232-4598-94F6-94C0EBAFC469}" type="datetime1">
               <a:rPr lang="en-US" smtClean="0"/>
-              <a:t>10/25/21</a:t>
+              <a:t>3/21/22</a:t>
             </a:fld>
             <a:endParaRPr lang="en-US"/>
           </a:p>
@@ -25524,7 +25614,7 @@
           <a:p>
             <a:fld id="{D753EFC8-4232-4598-94F6-94C0EBAFC469}" type="datetime1">
               <a:rPr lang="en-US" smtClean="0"/>
-              <a:t>10/25/21</a:t>
+              <a:t>3/21/22</a:t>
             </a:fld>
             <a:endParaRPr lang="en-US"/>
           </a:p>
@@ -25821,7 +25911,7 @@
           <a:p>
             <a:fld id="{D753EFC8-4232-4598-94F6-94C0EBAFC469}" type="datetime1">
               <a:rPr lang="en-US" smtClean="0"/>
-              <a:t>10/25/21</a:t>
+              <a:t>3/21/22</a:t>
             </a:fld>
             <a:endParaRPr lang="en-US"/>
           </a:p>
@@ -26006,7 +26096,7 @@
           <a:graphicData uri="http://schemas.openxmlformats.org/presentationml/2006/ole">
             <mc:AlternateContent xmlns:mc="http://schemas.openxmlformats.org/markup-compatibility/2006">
               <mc:Choice xmlns:v="urn:schemas-microsoft-com:vml" Requires="v">
-                <p:oleObj spid="_x0000_s13375" name="think-cell Slide" r:id="rId5" imgW="270" imgH="270" progId="TCLayout.ActiveDocument.1">
+                <p:oleObj spid="_x0000_s13376" name="think-cell Slide" r:id="rId5" imgW="270" imgH="270" progId="TCLayout.ActiveDocument.1">
                   <p:embed/>
                 </p:oleObj>
               </mc:Choice>
@@ -26758,7 +26848,7 @@
           <a:p>
             <a:fld id="{D753EFC8-4232-4598-94F6-94C0EBAFC469}" type="datetime1">
               <a:rPr lang="en-US" smtClean="0"/>
-              <a:t>10/25/21</a:t>
+              <a:t>3/21/22</a:t>
             </a:fld>
             <a:endParaRPr lang="en-US"/>
           </a:p>
@@ -27003,7 +27093,7 @@
           <a:p>
             <a:fld id="{6700A58B-DD98-43D0-B791-721480A02982}" type="datetime1">
               <a:rPr lang="en-US" smtClean="0"/>
-              <a:t>10/25/21</a:t>
+              <a:t>3/21/22</a:t>
             </a:fld>
             <a:endParaRPr lang="en-US"/>
           </a:p>
@@ -27387,7 +27477,7 @@
             </a:r>
             <a:r>
               <a:rPr lang="en-US" dirty="0"/>
-              <a:t> (our focus) seeks to </a:t>
+              <a:t> seeks to </a:t>
             </a:r>
             <a:r>
               <a:rPr lang="en-US" b="1" dirty="0"/>
@@ -27522,7 +27612,7 @@
           <a:p>
             <a:fld id="{6700A58B-DD98-43D0-B791-721480A02982}" type="datetime1">
               <a:rPr lang="en-US" smtClean="0"/>
-              <a:t>10/25/21</a:t>
+              <a:t>3/21/22</a:t>
             </a:fld>
             <a:endParaRPr lang="en-US"/>
           </a:p>
@@ -28702,7 +28792,7 @@
           <a:p>
             <a:fld id="{6700A58B-DD98-43D0-B791-721480A02982}" type="datetime1">
               <a:rPr lang="en-US" smtClean="0"/>
-              <a:t>10/25/21</a:t>
+              <a:t>3/21/22</a:t>
             </a:fld>
             <a:endParaRPr lang="en-US"/>
           </a:p>

</xml_diff>